<commit_message>
Fixing images for ER Diagrams slides
</commit_message>
<xml_diff>
--- a/Courses/Software-Sciences/Module-3-Databases-New/08-Relationships-and-ER-Diagrams/07-Relationships-ER-Diagrams.pptx
+++ b/Courses/Software-Sciences/Module-3-Databases-New/08-Relationships-and-ER-Diagrams/07-Relationships-ER-Diagrams.pptx
@@ -538,7 +538,7 @@
           <a:p>
             <a:fld id="{4E087215-0C8F-4762-A664-737A353EC9A4}" type="datetimeFigureOut">
               <a:rPr lang="bg-BG" smtClean="0"/>
-              <a:t>19.10.2023 г.</a:t>
+              <a:t>27.11.2023 г.</a:t>
             </a:fld>
             <a:endParaRPr lang="bg-BG"/>
           </a:p>
@@ -734,7 +734,7 @@
           <a:p>
             <a:fld id="{72D84649-876A-46C9-8472-14CB09C070D8}" type="datetimeFigureOut">
               <a:rPr lang="en-US" smtClean="0"/>
-              <a:t>10/19/2023</a:t>
+              <a:t>11/27/2023</a:t>
             </a:fld>
             <a:endParaRPr lang="en-US"/>
           </a:p>
@@ -8777,32 +8777,6 @@
       </p:sp>
       <p:pic>
         <p:nvPicPr>
-          <p:cNvPr id="31752" name="Picture 8" descr="Entity Relationship Diagrams with draw.io - draw.io"/>
-          <p:cNvPicPr>
-            <a:picLocks noChangeAspect="1" noChangeArrowheads="1"/>
-          </p:cNvPicPr>
-          <p:nvPr/>
-        </p:nvPicPr>
-        <p:blipFill>
-          <a:blip r:embed="rId4" cstate="print"/>
-          <a:srcRect/>
-          <a:stretch>
-            <a:fillRect/>
-          </a:stretch>
-        </p:blipFill>
-        <p:spPr bwMode="auto">
-          <a:xfrm>
-            <a:off x="7221000" y="3326143"/>
-            <a:ext cx="4724400" cy="2103120"/>
-          </a:xfrm>
-          <a:prstGeom prst="rect">
-            <a:avLst/>
-          </a:prstGeom>
-          <a:noFill/>
-        </p:spPr>
-      </p:pic>
-      <p:pic>
-        <p:nvPicPr>
           <p:cNvPr id="4" name="Picture 3" descr="A yellow and blue sign with white text&#10;&#10;Description automatically generated">
             <a:extLst>
               <a:ext uri="{FF2B5EF4-FFF2-40B4-BE49-F238E27FC236}">
@@ -8816,7 +8790,7 @@
           <p:nvPr/>
         </p:nvPicPr>
         <p:blipFill>
-          <a:blip r:embed="rId5">
+          <a:blip r:embed="rId4">
             <a:extLst>
               <a:ext uri="{28A0092B-C50C-407E-A947-70E740481C1C}">
                 <a14:useLocalDpi xmlns:a14="http://schemas.microsoft.com/office/drawing/2010/main" val="0"/>
@@ -8835,6 +8809,60 @@
           <a:prstGeom prst="rect">
             <a:avLst/>
           </a:prstGeom>
+        </p:spPr>
+      </p:pic>
+      <p:pic>
+        <p:nvPicPr>
+          <p:cNvPr id="1026" name="Picture 2" descr="What is an Entity Diagram (ERD)?. An Entity Relationship Diagram or ER… |  by sonia dumitru | Medium">
+            <a:extLst>
+              <a:ext uri="{FF2B5EF4-FFF2-40B4-BE49-F238E27FC236}">
+                <a16:creationId xmlns:a16="http://schemas.microsoft.com/office/drawing/2014/main" id="{AD743C9F-C9C1-102F-0902-467431AD14C4}"/>
+              </a:ext>
+            </a:extLst>
+          </p:cNvPr>
+          <p:cNvPicPr>
+            <a:picLocks noChangeAspect="1" noChangeArrowheads="1"/>
+          </p:cNvPicPr>
+          <p:nvPr/>
+        </p:nvPicPr>
+        <p:blipFill>
+          <a:blip r:embed="rId5">
+            <a:extLst>
+              <a:ext uri="{28A0092B-C50C-407E-A947-70E740481C1C}">
+                <a14:useLocalDpi xmlns:a14="http://schemas.microsoft.com/office/drawing/2010/main" val="0"/>
+              </a:ext>
+            </a:extLst>
+          </a:blip>
+          <a:srcRect/>
+          <a:stretch>
+            <a:fillRect/>
+          </a:stretch>
+        </p:blipFill>
+        <p:spPr bwMode="auto">
+          <a:xfrm>
+            <a:off x="7716000" y="2696338"/>
+            <a:ext cx="3770250" cy="2758720"/>
+          </a:xfrm>
+          <a:prstGeom prst="rect">
+            <a:avLst/>
+          </a:prstGeom>
+          <a:noFill/>
+          <a:ln>
+            <a:solidFill>
+              <a:schemeClr val="bg2">
+                <a:lumMod val="75000"/>
+              </a:schemeClr>
+            </a:solidFill>
+          </a:ln>
+          <a:extLst>
+            <a:ext uri="{909E8E84-426E-40DD-AFC4-6F175D3DCCD1}">
+              <a14:hiddenFill xmlns:a14="http://schemas.microsoft.com/office/drawing/2010/main">
+                <a:solidFill>
+                  <a:srgbClr val="FFFFFF"/>
+                </a:solidFill>
+              </a14:hiddenFill>
+            </a:ext>
+          </a:extLst>
         </p:spPr>
       </p:pic>
     </p:spTree>

</xml_diff>